<commit_message>
converting pptx to json
</commit_message>
<xml_diff>
--- a/test-files/universal-presentation-fdsfa3432412f.pptx
+++ b/test-files/universal-presentation-fdsfa3432412f.pptx
@@ -1,6 +1,6 @@
 
 <file path=ppt/presentation.xml><?xml version="1.0" encoding="utf-8"?>
-<p:presentation xmlns:a="http://schemas.openxmlformats.org/drawingml/2006/main" xmlns:r="http://schemas.openxmlformats.org/officeDocument/2006/relationships" xmlns:p="http://schemas.openxmlformats.org/presentationml/2006/main" showSpecialPlsOnTitleSld="0" removePersonalInfoOnSave="1" saveSubsetFonts="1" autoCompressPictures="0">
+<p:presentation xmlns:p15="http://schemas.microsoft.com/office/powerpoint/2012/main" xmlns:a="http://schemas.openxmlformats.org/drawingml/2006/main" xmlns:r="http://schemas.openxmlformats.org/officeDocument/2006/relationships" xmlns:p="http://schemas.openxmlformats.org/presentationml/2006/main" showSpecialPlsOnTitleSld="0" removePersonalInfoOnSave="1" saveSubsetFonts="1" autoCompressPictures="0">
   <p:sldMasterIdLst>
     <p:sldMasterId id="2147483648" r:id="rId1"/>
   </p:sldMasterIdLst>
@@ -1776,7 +1776,7 @@
 </file>
 
 <file path=ppt/slideLayouts/slideLayout1011.xml><?xml version="1.0" encoding="utf-8"?>
-<p:sldLayout xmlns:a="http://schemas.openxmlformats.org/drawingml/2006/main" xmlns:r="http://schemas.openxmlformats.org/officeDocument/2006/relationships" xmlns:p="http://schemas.openxmlformats.org/presentationml/2006/main" userDrawn="1">
+<p:sldLayout xmlns:a16="http://schemas.microsoft.com/office/drawing/2014/main" xmlns:adec="http://schemas.microsoft.com/office/drawing/2017/decorative" xmlns:p14="http://schemas.microsoft.com/office/powerpoint/2010/main" xmlns:a="http://schemas.openxmlformats.org/drawingml/2006/main" xmlns:r="http://schemas.openxmlformats.org/officeDocument/2006/relationships" xmlns:p="http://schemas.openxmlformats.org/presentationml/2006/main" userDrawn="1">
   <p:cSld name="SmartArt 2">
     <p:bg>
       <p:bgPr>
@@ -2459,7 +2459,7 @@
 </file>
 
 <file path=ppt/slideLayouts/slideLayout119.xml><?xml version="1.0" encoding="utf-8"?>
-<p:sldLayout xmlns:a="http://schemas.openxmlformats.org/drawingml/2006/main" xmlns:r="http://schemas.openxmlformats.org/officeDocument/2006/relationships" xmlns:p="http://schemas.openxmlformats.org/presentationml/2006/main" userDrawn="1">
+<p:sldLayout xmlns:a16="http://schemas.microsoft.com/office/drawing/2014/main" xmlns:adec="http://schemas.microsoft.com/office/drawing/2017/decorative" xmlns:p14="http://schemas.microsoft.com/office/powerpoint/2010/main" xmlns:a="http://schemas.openxmlformats.org/drawingml/2006/main" xmlns:r="http://schemas.openxmlformats.org/officeDocument/2006/relationships" xmlns:p="http://schemas.openxmlformats.org/presentationml/2006/main" userDrawn="1">
   <p:cSld name="Title and Content and Image 2">
     <p:spTree>
       <p:nvGrpSpPr>
@@ -3405,7 +3405,7 @@
 </file>
 
 <file path=ppt/slideLayouts/slideLayout125.xml><?xml version="1.0" encoding="utf-8"?>
-<p:sldLayout xmlns:a="http://schemas.openxmlformats.org/drawingml/2006/main" xmlns:r="http://schemas.openxmlformats.org/officeDocument/2006/relationships" xmlns:p="http://schemas.openxmlformats.org/presentationml/2006/main" type="obj" preserve="1">
+<p:sldLayout xmlns:a16="http://schemas.microsoft.com/office/drawing/2014/main" xmlns:adec="http://schemas.microsoft.com/office/drawing/2017/decorative" xmlns:p14="http://schemas.microsoft.com/office/powerpoint/2010/main" xmlns:a="http://schemas.openxmlformats.org/drawingml/2006/main" xmlns:r="http://schemas.openxmlformats.org/officeDocument/2006/relationships" xmlns:p="http://schemas.openxmlformats.org/presentationml/2006/main" type="obj" preserve="1">
   <p:cSld name="Chart ">
     <p:bg>
       <p:bgPr>
@@ -3993,7 +3993,7 @@
 </file>
 
 <file path=ppt/slideLayouts/slideLayout133.xml><?xml version="1.0" encoding="utf-8"?>
-<p:sldLayout xmlns:a="http://schemas.openxmlformats.org/drawingml/2006/main" xmlns:r="http://schemas.openxmlformats.org/officeDocument/2006/relationships" xmlns:p="http://schemas.openxmlformats.org/presentationml/2006/main" type="title" preserve="1">
+<p:sldLayout xmlns:a16="http://schemas.microsoft.com/office/drawing/2014/main" xmlns:adec="http://schemas.microsoft.com/office/drawing/2017/decorative" xmlns:p14="http://schemas.microsoft.com/office/powerpoint/2010/main" xmlns:a="http://schemas.openxmlformats.org/drawingml/2006/main" xmlns:r="http://schemas.openxmlformats.org/officeDocument/2006/relationships" xmlns:p="http://schemas.openxmlformats.org/presentationml/2006/main" type="title" preserve="1">
   <p:cSld name="End Slide">
     <p:spTree>
       <p:nvGrpSpPr>
@@ -4729,7 +4729,7 @@
 </file>
 
 <file path=ppt/slideLayouts/slideLayout17.xml><?xml version="1.0" encoding="utf-8"?>
-<p:sldLayout xmlns:a="http://schemas.openxmlformats.org/drawingml/2006/main" xmlns:r="http://schemas.openxmlformats.org/officeDocument/2006/relationships" xmlns:p="http://schemas.openxmlformats.org/presentationml/2006/main" preserve="1" userDrawn="1">
+<p:sldLayout xmlns:a16="http://schemas.microsoft.com/office/drawing/2014/main" xmlns:adec="http://schemas.microsoft.com/office/drawing/2017/decorative" xmlns:p14="http://schemas.microsoft.com/office/powerpoint/2010/main" xmlns:a="http://schemas.openxmlformats.org/drawingml/2006/main" xmlns:r="http://schemas.openxmlformats.org/officeDocument/2006/relationships" xmlns:p="http://schemas.openxmlformats.org/presentationml/2006/main" preserve="1" userDrawn="1">
   <p:cSld name="Title Slide">
     <p:spTree>
       <p:nvGrpSpPr>
@@ -5648,7 +5648,7 @@
 </file>
 
 <file path=ppt/slideLayouts/slideLayout26.xml><?xml version="1.0" encoding="utf-8"?>
-<p:sldLayout xmlns:a="http://schemas.openxmlformats.org/drawingml/2006/main" xmlns:r="http://schemas.openxmlformats.org/officeDocument/2006/relationships" xmlns:p="http://schemas.openxmlformats.org/presentationml/2006/main" type="obj" preserve="1">
+<p:sldLayout xmlns:a16="http://schemas.microsoft.com/office/drawing/2014/main" xmlns:adec="http://schemas.microsoft.com/office/drawing/2017/decorative" xmlns:p14="http://schemas.microsoft.com/office/powerpoint/2010/main" xmlns:a="http://schemas.openxmlformats.org/drawingml/2006/main" xmlns:r="http://schemas.openxmlformats.org/officeDocument/2006/relationships" xmlns:p="http://schemas.openxmlformats.org/presentationml/2006/main" type="obj" preserve="1">
   <p:cSld name="Title and Content">
     <p:spTree>
       <p:nvGrpSpPr>
@@ -6564,7 +6564,7 @@
 </file>
 
 <file path=ppt/slideLayouts/slideLayout34.xml><?xml version="1.0" encoding="utf-8"?>
-<p:sldLayout xmlns:a="http://schemas.openxmlformats.org/drawingml/2006/main" xmlns:r="http://schemas.openxmlformats.org/officeDocument/2006/relationships" xmlns:p="http://schemas.openxmlformats.org/presentationml/2006/main" userDrawn="1">
+<p:sldLayout xmlns:a16="http://schemas.microsoft.com/office/drawing/2014/main" xmlns:adec="http://schemas.microsoft.com/office/drawing/2017/decorative" xmlns:p14="http://schemas.microsoft.com/office/powerpoint/2010/main" xmlns:a="http://schemas.openxmlformats.org/drawingml/2006/main" xmlns:r="http://schemas.openxmlformats.org/officeDocument/2006/relationships" xmlns:p="http://schemas.openxmlformats.org/presentationml/2006/main" userDrawn="1">
   <p:cSld name="Title and Right Image">
     <p:spTree>
       <p:nvGrpSpPr>
@@ -7429,7 +7429,7 @@
 </file>
 
 <file path=ppt/slideLayouts/slideLayout412.xml><?xml version="1.0" encoding="utf-8"?>
-<p:sldLayout xmlns:a="http://schemas.openxmlformats.org/drawingml/2006/main" xmlns:r="http://schemas.openxmlformats.org/officeDocument/2006/relationships" xmlns:p="http://schemas.openxmlformats.org/presentationml/2006/main" userDrawn="1">
+<p:sldLayout xmlns:a16="http://schemas.microsoft.com/office/drawing/2014/main" xmlns:adec="http://schemas.microsoft.com/office/drawing/2017/decorative" xmlns:p14="http://schemas.microsoft.com/office/powerpoint/2010/main" xmlns:a="http://schemas.openxmlformats.org/drawingml/2006/main" xmlns:r="http://schemas.openxmlformats.org/officeDocument/2006/relationships" xmlns:p="http://schemas.openxmlformats.org/presentationml/2006/main" userDrawn="1">
   <p:cSld name="Title and Left Image">
     <p:spTree>
       <p:nvGrpSpPr>
@@ -8368,7 +8368,7 @@
 </file>
 
 <file path=ppt/slideLayouts/slideLayout510.xml><?xml version="1.0" encoding="utf-8"?>
-<p:sldLayout xmlns:a="http://schemas.openxmlformats.org/drawingml/2006/main" xmlns:r="http://schemas.openxmlformats.org/officeDocument/2006/relationships" xmlns:p="http://schemas.openxmlformats.org/presentationml/2006/main" preserve="1" userDrawn="1">
+<p:sldLayout xmlns:a16="http://schemas.microsoft.com/office/drawing/2014/main" xmlns:adec="http://schemas.microsoft.com/office/drawing/2017/decorative" xmlns:p14="http://schemas.microsoft.com/office/powerpoint/2010/main" xmlns:a="http://schemas.openxmlformats.org/drawingml/2006/main" xmlns:r="http://schemas.openxmlformats.org/officeDocument/2006/relationships" xmlns:p="http://schemas.openxmlformats.org/presentationml/2006/main" preserve="1" userDrawn="1">
   <p:cSld name="Title and content 2">
     <p:bg>
       <p:bgPr>
@@ -9094,7 +9094,7 @@
 </file>
 
 <file path=ppt/slideLayouts/slideLayout68.xml><?xml version="1.0" encoding="utf-8"?>
-<p:sldLayout xmlns:a="http://schemas.openxmlformats.org/drawingml/2006/main" xmlns:r="http://schemas.openxmlformats.org/officeDocument/2006/relationships" xmlns:p="http://schemas.openxmlformats.org/presentationml/2006/main" type="title" preserve="1">
+<p:sldLayout xmlns:a16="http://schemas.microsoft.com/office/drawing/2014/main" xmlns:adec="http://schemas.microsoft.com/office/drawing/2017/decorative" xmlns:p14="http://schemas.microsoft.com/office/powerpoint/2010/main" xmlns:a="http://schemas.openxmlformats.org/drawingml/2006/main" xmlns:r="http://schemas.openxmlformats.org/officeDocument/2006/relationships" xmlns:p="http://schemas.openxmlformats.org/presentationml/2006/main" type="title" preserve="1">
   <p:cSld name="Section title">
     <p:spTree>
       <p:nvGrpSpPr>
@@ -9844,7 +9844,7 @@
 </file>
 
 <file path=ppt/slideLayouts/slideLayout71.xml><?xml version="1.0" encoding="utf-8"?>
-<p:sldLayout xmlns:a="http://schemas.openxmlformats.org/drawingml/2006/main" xmlns:r="http://schemas.openxmlformats.org/officeDocument/2006/relationships" xmlns:p="http://schemas.openxmlformats.org/presentationml/2006/main" preserve="1" userDrawn="1">
+<p:sldLayout xmlns:a16="http://schemas.microsoft.com/office/drawing/2014/main" xmlns:adec="http://schemas.microsoft.com/office/drawing/2017/decorative" xmlns:p14="http://schemas.microsoft.com/office/powerpoint/2010/main" xmlns:a="http://schemas.openxmlformats.org/drawingml/2006/main" xmlns:r="http://schemas.openxmlformats.org/officeDocument/2006/relationships" xmlns:p="http://schemas.openxmlformats.org/presentationml/2006/main" preserve="1" userDrawn="1">
   <p:cSld name="Title and 2 Column Content">
     <p:spTree>
       <p:nvGrpSpPr>
@@ -10881,7 +10881,7 @@
 </file>
 
 <file path=ppt/slideLayouts/slideLayout82.xml><?xml version="1.0" encoding="utf-8"?>
-<p:sldLayout xmlns:a="http://schemas.openxmlformats.org/drawingml/2006/main" xmlns:r="http://schemas.openxmlformats.org/officeDocument/2006/relationships" xmlns:p="http://schemas.openxmlformats.org/presentationml/2006/main" preserve="1" userDrawn="1">
+<p:sldLayout xmlns:a16="http://schemas.microsoft.com/office/drawing/2014/main" xmlns:adec="http://schemas.microsoft.com/office/drawing/2017/decorative" xmlns:p14="http://schemas.microsoft.com/office/powerpoint/2010/main" xmlns:a="http://schemas.openxmlformats.org/drawingml/2006/main" xmlns:r="http://schemas.openxmlformats.org/officeDocument/2006/relationships" xmlns:p="http://schemas.openxmlformats.org/presentationml/2006/main" preserve="1" userDrawn="1">
   <p:cSld name="Title and 2 content">
     <p:bg>
       <p:bgPr>
@@ -11585,7 +11585,7 @@
 </file>
 
 <file path=ppt/slideLayouts/slideLayout913.xml><?xml version="1.0" encoding="utf-8"?>
-<p:sldLayout xmlns:a="http://schemas.openxmlformats.org/drawingml/2006/main" xmlns:r="http://schemas.openxmlformats.org/officeDocument/2006/relationships" xmlns:p="http://schemas.openxmlformats.org/presentationml/2006/main" userDrawn="1">
+<p:sldLayout xmlns:a16="http://schemas.microsoft.com/office/drawing/2014/main" xmlns:adec="http://schemas.microsoft.com/office/drawing/2017/decorative" xmlns:p14="http://schemas.microsoft.com/office/powerpoint/2010/main" xmlns:a="http://schemas.openxmlformats.org/drawingml/2006/main" xmlns:r="http://schemas.openxmlformats.org/officeDocument/2006/relationships" xmlns:p="http://schemas.openxmlformats.org/presentationml/2006/main" userDrawn="1">
   <p:cSld name="Title and Content and Image 1">
     <p:bg>
       <p:bgPr>
@@ -12230,7 +12230,7 @@
 </file>
 
 <file path=ppt/slideMasters/slideMaster11.xml><?xml version="1.0" encoding="utf-8"?>
-<p:sldMaster xmlns:a="http://schemas.openxmlformats.org/drawingml/2006/main" xmlns:r="http://schemas.openxmlformats.org/officeDocument/2006/relationships" xmlns:p="http://schemas.openxmlformats.org/presentationml/2006/main">
+<p:sldMaster xmlns:a16="http://schemas.microsoft.com/office/drawing/2014/main" xmlns:p14="http://schemas.microsoft.com/office/powerpoint/2010/main" xmlns:p15="http://schemas.microsoft.com/office/powerpoint/2012/main" xmlns:a="http://schemas.openxmlformats.org/drawingml/2006/main" xmlns:r="http://schemas.openxmlformats.org/officeDocument/2006/relationships" xmlns:p="http://schemas.openxmlformats.org/presentationml/2006/main">
   <p:cSld>
     <p:bg>
       <p:bgRef idx="1001">
@@ -12890,7 +12890,7 @@
 </file>
 
 <file path=ppt/slides/slide108.xml><?xml version="1.0" encoding="utf-8"?>
-<p:sld xmlns:a="http://schemas.openxmlformats.org/drawingml/2006/main" xmlns:r="http://schemas.openxmlformats.org/officeDocument/2006/relationships" xmlns:p="http://schemas.openxmlformats.org/presentationml/2006/main">
+<p:sld xmlns:a16="http://schemas.microsoft.com/office/drawing/2014/main" xmlns:p14="http://schemas.microsoft.com/office/powerpoint/2010/main" xmlns:a="http://schemas.openxmlformats.org/drawingml/2006/main" xmlns:r="http://schemas.openxmlformats.org/officeDocument/2006/relationships" xmlns:p="http://schemas.openxmlformats.org/presentationml/2006/main">
   <p:cSld>
     <p:spTree>
       <p:nvGrpSpPr>
@@ -13438,7 +13438,7 @@
 </file>
 
 <file path=ppt/slides/slide115.xml><?xml version="1.0" encoding="utf-8"?>
-<p:sld xmlns:a="http://schemas.openxmlformats.org/drawingml/2006/main" xmlns:r="http://schemas.openxmlformats.org/officeDocument/2006/relationships" xmlns:p="http://schemas.openxmlformats.org/presentationml/2006/main">
+<p:sld xmlns:a16="http://schemas.microsoft.com/office/drawing/2014/main" xmlns:p14="http://schemas.microsoft.com/office/powerpoint/2010/main" xmlns:a="http://schemas.openxmlformats.org/drawingml/2006/main" xmlns:r="http://schemas.openxmlformats.org/officeDocument/2006/relationships" xmlns:p="http://schemas.openxmlformats.org/presentationml/2006/main">
   <p:cSld>
     <p:spTree>
       <p:nvGrpSpPr>
@@ -13646,7 +13646,7 @@
 </file>
 
 <file path=ppt/slides/slide122.xml><?xml version="1.0" encoding="utf-8"?>
-<p:sld xmlns:a="http://schemas.openxmlformats.org/drawingml/2006/main" xmlns:r="http://schemas.openxmlformats.org/officeDocument/2006/relationships" xmlns:p="http://schemas.openxmlformats.org/presentationml/2006/main">
+<p:sld xmlns:a16="http://schemas.microsoft.com/office/drawing/2014/main" xmlns:p14="http://schemas.microsoft.com/office/powerpoint/2010/main" xmlns:a="http://schemas.openxmlformats.org/drawingml/2006/main" xmlns:r="http://schemas.openxmlformats.org/officeDocument/2006/relationships" xmlns:p="http://schemas.openxmlformats.org/presentationml/2006/main">
   <p:cSld>
     <p:spTree>
       <p:nvGrpSpPr>
@@ -14152,7 +14152,7 @@
 </file>
 
 <file path=ppt/slides/slide1313.xml><?xml version="1.0" encoding="utf-8"?>
-<p:sld xmlns:a="http://schemas.openxmlformats.org/drawingml/2006/main" xmlns:r="http://schemas.openxmlformats.org/officeDocument/2006/relationships" xmlns:p="http://schemas.openxmlformats.org/presentationml/2006/main">
+<p:sld xmlns:a16="http://schemas.microsoft.com/office/drawing/2014/main" xmlns:p14="http://schemas.microsoft.com/office/powerpoint/2010/main" xmlns:a="http://schemas.openxmlformats.org/drawingml/2006/main" xmlns:r="http://schemas.openxmlformats.org/officeDocument/2006/relationships" xmlns:p="http://schemas.openxmlformats.org/presentationml/2006/main">
   <p:cSld>
     <p:spTree>
       <p:nvGrpSpPr>
@@ -14266,7 +14266,7 @@
 </file>
 
 <file path=ppt/slides/slide16.xml><?xml version="1.0" encoding="utf-8"?>
-<p:sld xmlns:a="http://schemas.openxmlformats.org/drawingml/2006/main" xmlns:r="http://schemas.openxmlformats.org/officeDocument/2006/relationships" xmlns:p="http://schemas.openxmlformats.org/presentationml/2006/main">
+<p:sld xmlns:a16="http://schemas.microsoft.com/office/drawing/2014/main" xmlns:p14="http://schemas.microsoft.com/office/powerpoint/2010/main" xmlns:a="http://schemas.openxmlformats.org/drawingml/2006/main" xmlns:r="http://schemas.openxmlformats.org/officeDocument/2006/relationships" xmlns:p="http://schemas.openxmlformats.org/presentationml/2006/main">
   <p:cSld>
     <p:spTree>
       <p:nvGrpSpPr>
@@ -14329,7 +14329,7 @@
 </file>
 
 <file path=ppt/slides/slide23.xml><?xml version="1.0" encoding="utf-8"?>
-<p:sld xmlns:a="http://schemas.openxmlformats.org/drawingml/2006/main" xmlns:r="http://schemas.openxmlformats.org/officeDocument/2006/relationships" xmlns:p="http://schemas.openxmlformats.org/presentationml/2006/main">
+<p:sld xmlns:a16="http://schemas.microsoft.com/office/drawing/2014/main" xmlns:p14="http://schemas.microsoft.com/office/powerpoint/2010/main" xmlns:a="http://schemas.openxmlformats.org/drawingml/2006/main" xmlns:r="http://schemas.openxmlformats.org/officeDocument/2006/relationships" xmlns:p="http://schemas.openxmlformats.org/presentationml/2006/main">
   <p:cSld>
     <p:spTree>
       <p:nvGrpSpPr>
@@ -14451,7 +14451,7 @@
 </file>
 
 <file path=ppt/slides/slide311.xml><?xml version="1.0" encoding="utf-8"?>
-<p:sld xmlns:a="http://schemas.openxmlformats.org/drawingml/2006/main" xmlns:r="http://schemas.openxmlformats.org/officeDocument/2006/relationships" xmlns:p="http://schemas.openxmlformats.org/presentationml/2006/main">
+<p:sld xmlns:a16="http://schemas.microsoft.com/office/drawing/2014/main" xmlns:p14="http://schemas.microsoft.com/office/powerpoint/2010/main" xmlns:a="http://schemas.openxmlformats.org/drawingml/2006/main" xmlns:r="http://schemas.openxmlformats.org/officeDocument/2006/relationships" xmlns:p="http://schemas.openxmlformats.org/presentationml/2006/main">
   <p:cSld>
     <p:spTree>
       <p:nvGrpSpPr>
@@ -14550,7 +14550,7 @@
 </file>
 
 <file path=ppt/slides/slide49.xml><?xml version="1.0" encoding="utf-8"?>
-<p:sld xmlns:a="http://schemas.openxmlformats.org/drawingml/2006/main" xmlns:r="http://schemas.openxmlformats.org/officeDocument/2006/relationships" xmlns:p="http://schemas.openxmlformats.org/presentationml/2006/main">
+<p:sld xmlns:a16="http://schemas.microsoft.com/office/drawing/2014/main" xmlns:p14="http://schemas.microsoft.com/office/powerpoint/2010/main" xmlns:a="http://schemas.openxmlformats.org/drawingml/2006/main" xmlns:r="http://schemas.openxmlformats.org/officeDocument/2006/relationships" xmlns:p="http://schemas.openxmlformats.org/presentationml/2006/main">
   <p:cSld>
     <p:spTree>
       <p:nvGrpSpPr>
@@ -14682,7 +14682,7 @@
 </file>
 
 <file path=ppt/slides/slide57.xml><?xml version="1.0" encoding="utf-8"?>
-<p:sld xmlns:a="http://schemas.openxmlformats.org/drawingml/2006/main" xmlns:r="http://schemas.openxmlformats.org/officeDocument/2006/relationships" xmlns:p="http://schemas.openxmlformats.org/presentationml/2006/main">
+<p:sld xmlns:a16="http://schemas.microsoft.com/office/drawing/2014/main" xmlns:p14="http://schemas.microsoft.com/office/powerpoint/2010/main" xmlns:a="http://schemas.openxmlformats.org/drawingml/2006/main" xmlns:r="http://schemas.openxmlformats.org/officeDocument/2006/relationships" xmlns:p="http://schemas.openxmlformats.org/presentationml/2006/main">
   <p:cSld>
     <p:spTree>
       <p:nvGrpSpPr>
@@ -14798,7 +14798,7 @@
 </file>
 
 <file path=ppt/slides/slide64.xml><?xml version="1.0" encoding="utf-8"?>
-<p:sld xmlns:a="http://schemas.openxmlformats.org/drawingml/2006/main" xmlns:r="http://schemas.openxmlformats.org/officeDocument/2006/relationships" xmlns:p="http://schemas.openxmlformats.org/presentationml/2006/main">
+<p:sld xmlns:a16="http://schemas.microsoft.com/office/drawing/2014/main" xmlns:p14="http://schemas.microsoft.com/office/powerpoint/2010/main" xmlns:a="http://schemas.openxmlformats.org/drawingml/2006/main" xmlns:r="http://schemas.openxmlformats.org/officeDocument/2006/relationships" xmlns:p="http://schemas.openxmlformats.org/presentationml/2006/main">
   <p:cSld>
     <p:spTree>
       <p:nvGrpSpPr>
@@ -14901,7 +14901,7 @@
 </file>
 
 <file path=ppt/slides/slide71.xml><?xml version="1.0" encoding="utf-8"?>
-<p:sld xmlns:a="http://schemas.openxmlformats.org/drawingml/2006/main" xmlns:r="http://schemas.openxmlformats.org/officeDocument/2006/relationships" xmlns:p="http://schemas.openxmlformats.org/presentationml/2006/main">
+<p:sld xmlns:a16="http://schemas.microsoft.com/office/drawing/2014/main" xmlns:p14="http://schemas.microsoft.com/office/powerpoint/2010/main" xmlns:a="http://schemas.openxmlformats.org/drawingml/2006/main" xmlns:r="http://schemas.openxmlformats.org/officeDocument/2006/relationships" xmlns:p="http://schemas.openxmlformats.org/presentationml/2006/main">
   <p:cSld>
     <p:spTree>
       <p:nvGrpSpPr>
@@ -15084,7 +15084,7 @@
 </file>
 
 <file path=ppt/slides/slide812.xml><?xml version="1.0" encoding="utf-8"?>
-<p:sld xmlns:a="http://schemas.openxmlformats.org/drawingml/2006/main" xmlns:r="http://schemas.openxmlformats.org/officeDocument/2006/relationships" xmlns:p="http://schemas.openxmlformats.org/presentationml/2006/main">
+<p:sld xmlns:a16="http://schemas.microsoft.com/office/drawing/2014/main" xmlns:p14="http://schemas.microsoft.com/office/powerpoint/2010/main" xmlns:a="http://schemas.openxmlformats.org/drawingml/2006/main" xmlns:r="http://schemas.openxmlformats.org/officeDocument/2006/relationships" xmlns:p="http://schemas.openxmlformats.org/presentationml/2006/main">
   <p:cSld>
     <p:spTree>
       <p:nvGrpSpPr>
@@ -15260,7 +15260,7 @@
 </file>
 
 <file path=ppt/slides/slide910.xml><?xml version="1.0" encoding="utf-8"?>
-<p:sld xmlns:a="http://schemas.openxmlformats.org/drawingml/2006/main" xmlns:r="http://schemas.openxmlformats.org/officeDocument/2006/relationships" xmlns:p="http://schemas.openxmlformats.org/presentationml/2006/main">
+<p:sld xmlns:a16="http://schemas.microsoft.com/office/drawing/2014/main" xmlns:p14="http://schemas.microsoft.com/office/powerpoint/2010/main" xmlns:a="http://schemas.openxmlformats.org/drawingml/2006/main" xmlns:r="http://schemas.openxmlformats.org/officeDocument/2006/relationships" xmlns:p="http://schemas.openxmlformats.org/presentationml/2006/main">
   <p:cSld>
     <p:spTree>
       <p:nvGrpSpPr>
@@ -15398,7 +15398,7 @@
 </file>
 
 <file path=ppt/theme/theme12.xml><?xml version="1.0" encoding="utf-8"?>
-<a:theme xmlns:a="http://schemas.openxmlformats.org/drawingml/2006/main" name="Custom">
+<a:theme xmlns:thm15="http://schemas.microsoft.com/office/thememl/2012/main" xmlns:a="http://schemas.openxmlformats.org/drawingml/2006/main" name="Custom">
   <a:themeElements>
     <a:clrScheme name="Universal Color Block">
       <a:dk1>

</xml_diff>

<commit_message>
export and import text using openxml library
</commit_message>
<xml_diff>
--- a/test-files/universal-presentation-fdsfa3432412f.pptx
+++ b/test-files/universal-presentation-fdsfa3432412f.pptx
@@ -14229,7 +14229,7 @@
           <a:p>
             <a:r>
               <a:rPr lang="en-US" dirty="0"/>
-              <a:t>Brita Tamm</a:t>
+              <a:t>Sifatul Rabbi</a:t>
             </a:r>
           </a:p>
           <a:p>
@@ -14241,13 +14241,13 @@
           <a:p>
             <a:r>
               <a:rPr lang="en-US" dirty="0"/>
-              <a:t>brita@firstupconsultants.com</a:t>
+              <a:t>sifatul.rabbi@sequesto.com</a:t>
             </a:r>
           </a:p>
           <a:p>
             <a:r>
               <a:rPr lang="en-US" dirty="0"/>
-              <a:t>www.firstupconsultants.com</a:t>
+              <a:t>sifatulrabbi.com</a:t>
             </a:r>
           </a:p>
         </p:txBody>

</xml_diff>

<commit_message>
updating pptx using openxml library
</commit_message>
<xml_diff>
--- a/test-files/universal-presentation-fdsfa3432412f.pptx
+++ b/test-files/universal-presentation-fdsfa3432412f.pptx
@@ -12934,7 +12934,7 @@
           <a:p>
             <a:r>
               <a:rPr lang="en-US" dirty="0"/>
-              <a:t>Dynamic delivery</a:t>
+              <a:t>Success Metrics</a:t>
             </a:r>
           </a:p>
         </p:txBody>
@@ -12967,13 +12967,13 @@
           <a:p>
             <a:r>
               <a:rPr lang="en-US" dirty="0"/>
-              <a:t>Learn to infuse energy into your delivery to leave a lasting impression</a:t>
+              <a:t>Metric</a:t>
             </a:r>
           </a:p>
           <a:p>
             <a:r>
               <a:rPr lang="en-US" dirty="0"/>
-              <a:t>One of the goals of effective communication is to motivate your audience</a:t>
+              <a:t>Target</a:t>
             </a:r>
           </a:p>
           <a:p>
@@ -13051,7 +13051,7 @@
                       <a:pPr algn="ctr"/>
                       <a:r>
                         <a:rPr lang="en-US" sz="1800" dirty="0"/>
-                        <a:t>Metric</a:t>
+                        <a:t>Current/Expected</a:t>
                       </a:r>
                     </a:p>
                   </a:txBody>
@@ -13065,7 +13065,7 @@
                       <a:pPr algn="ctr"/>
                       <a:r>
                         <a:rPr lang="en-US" sz="1800" dirty="0"/>
-                        <a:t>Measurement</a:t>
+                        <a:t>CSAT Improvement (%)</a:t>
                       </a:r>
                     </a:p>
                   </a:txBody>
@@ -13079,7 +13079,7 @@
                       <a:pPr algn="ctr"/>
                       <a:r>
                         <a:rPr lang="en-US" sz="1800" dirty="0"/>
-                        <a:t>Target</a:t>
+                        <a:t>10%</a:t>
                       </a:r>
                     </a:p>
                   </a:txBody>
@@ -13093,7 +13093,7 @@
                       <a:pPr algn="ctr"/>
                       <a:r>
                         <a:rPr lang="en-US" sz="1800" dirty="0"/>
-                        <a:t>Actual</a:t>
+                        <a:t>-</a:t>
                       </a:r>
                     </a:p>
                   </a:txBody>
@@ -13114,7 +13114,7 @@
                       <a:pPr algn="ctr"/>
                       <a:r>
                         <a:rPr lang="en-US" dirty="0"/>
-                        <a:t>Audience attendance</a:t>
+                        <a:t>Agent Workload Reduction (%)</a:t>
                       </a:r>
                     </a:p>
                   </a:txBody>
@@ -13128,7 +13128,7 @@
                       <a:pPr algn="ctr"/>
                       <a:r>
                         <a:rPr lang="en-US" dirty="0"/>
-                        <a:t># of attendees</a:t>
+                        <a:t>30%</a:t>
                       </a:r>
                     </a:p>
                   </a:txBody>
@@ -13142,7 +13142,7 @@
                       <a:pPr algn="ctr"/>
                       <a:r>
                         <a:rPr lang="en-US" dirty="0"/>
-                        <a:t>150</a:t>
+                        <a:t>-</a:t>
                       </a:r>
                     </a:p>
                   </a:txBody>
@@ -13156,7 +13156,7 @@
                       <a:pPr algn="ctr"/>
                       <a:r>
                         <a:rPr lang="en-US" dirty="0"/>
-                        <a:t>120</a:t>
+                        <a:t>Query Automation (%)</a:t>
                       </a:r>
                     </a:p>
                   </a:txBody>
@@ -13177,7 +13177,7 @@
                       <a:pPr algn="ctr"/>
                       <a:r>
                         <a:rPr lang="en-US" dirty="0"/>
-                        <a:t>Engagement duration</a:t>
+                        <a:t>80%</a:t>
                       </a:r>
                     </a:p>
                   </a:txBody>
@@ -13191,7 +13191,7 @@
                       <a:pPr algn="ctr"/>
                       <a:r>
                         <a:rPr lang="en-US" dirty="0"/>
-                        <a:t>Minutes</a:t>
+                        <a:t>-</a:t>
                       </a:r>
                     </a:p>
                   </a:txBody>
@@ -13205,7 +13205,7 @@
                       <a:pPr algn="ctr"/>
                       <a:r>
                         <a:rPr lang="en-US" dirty="0"/>
-                        <a:t>60</a:t>
+                        <a:t>Response Time (seconds)</a:t>
                       </a:r>
                     </a:p>
                   </a:txBody>
@@ -13219,7 +13219,7 @@
                       <a:pPr algn="ctr"/>
                       <a:r>
                         <a:rPr lang="en-US" dirty="0"/>
-                        <a:t>75</a:t>
+                        <a:t>&lt;30</a:t>
                       </a:r>
                     </a:p>
                   </a:txBody>
@@ -13240,7 +13240,7 @@
                       <a:pPr algn="ctr"/>
                       <a:r>
                         <a:rPr lang="en-US" dirty="0"/>
-                        <a:t>Q&amp;A interaction</a:t>
+                        <a:t>-</a:t>
                       </a:r>
                     </a:p>
                   </a:txBody>
@@ -13254,7 +13254,7 @@
                       <a:pPr algn="ctr"/>
                       <a:r>
                         <a:rPr lang="en-US" dirty="0"/>
-                        <a:t># of questions</a:t>
+                        <a:t>Resolution Rate (%)</a:t>
                       </a:r>
                     </a:p>
                   </a:txBody>
@@ -13268,7 +13268,7 @@
                       <a:pPr algn="ctr"/>
                       <a:r>
                         <a:rPr lang="en-US" dirty="0"/>
-                        <a:t>10</a:t>
+                        <a:t>90%</a:t>
                       </a:r>
                     </a:p>
                   </a:txBody>
@@ -13282,7 +13282,7 @@
                       <a:pPr algn="ctr"/>
                       <a:r>
                         <a:rPr lang="en-US" dirty="0"/>
-                        <a:t>15</a:t>
+                        <a:t>-</a:t>
                       </a:r>
                     </a:p>
                   </a:txBody>
@@ -13303,7 +13303,7 @@
                       <a:pPr algn="ctr"/>
                       <a:r>
                         <a:rPr lang="en-US" dirty="0"/>
-                        <a:t>Positive feedback</a:t>
+                        <a:t>Compliance Incidents</a:t>
                       </a:r>
                     </a:p>
                   </a:txBody>
@@ -13317,7 +13317,7 @@
                       <a:pPr algn="ctr"/>
                       <a:r>
                         <a:rPr lang="en-US" dirty="0"/>
-                        <a:t>Percentage (%)</a:t>
+                        <a:t>0</a:t>
                       </a:r>
                     </a:p>
                   </a:txBody>
@@ -13331,7 +13331,7 @@
                       <a:pPr algn="ctr"/>
                       <a:r>
                         <a:rPr lang="en-US" dirty="0"/>
-                        <a:t>90</a:t>
+                        <a:t>-</a:t>
                       </a:r>
                     </a:p>
                   </a:txBody>
@@ -13482,7 +13482,7 @@
           <a:p>
             <a:r>
               <a:rPr lang="en-US" dirty="0"/>
-              <a:t>Final tips &amp; takeaways</a:t>
+              <a:t>Team &amp; Key Contacts</a:t>
             </a:r>
           </a:p>
         </p:txBody>
@@ -13515,31 +13515,31 @@
           <a:p>
             <a:r>
               <a:rPr lang="en-US" dirty="0"/>
-              <a:t>Seek feedback</a:t>
+              <a:t>James SEQUESTO</a:t>
             </a:r>
           </a:p>
           <a:p>
             <a:r>
               <a:rPr lang="en-US" dirty="0"/>
-              <a:t>Reflect on performance</a:t>
+              <a:t>Sifatul Rabbi</a:t>
             </a:r>
           </a:p>
           <a:p>
             <a:r>
               <a:rPr lang="en-US" dirty="0"/>
-              <a:t>Explore new techniques</a:t>
+              <a:t>Farhana Rahman, Executive Sponsor (farhana.rahman@telecomx.com)</a:t>
             </a:r>
           </a:p>
           <a:p>
             <a:r>
               <a:rPr lang="en-US" dirty="0"/>
-              <a:t>Set personal goals</a:t>
+              <a:t>Imran Hossain, Project Owner (imran.hossain@telecomx.com)</a:t>
             </a:r>
           </a:p>
           <a:p>
             <a:r>
               <a:rPr lang="en-US" dirty="0"/>
-              <a:t>Iterate and adapt</a:t>
+              <a:t>See proposal for full contact list &amp; bios</a:t>
             </a:r>
           </a:p>
         </p:txBody>
@@ -13690,7 +13690,7 @@
           <a:p>
             <a:r>
               <a:rPr lang="en-US" dirty="0"/>
-              <a:t>Speaking engagement metrics</a:t>
+              <a:t>Project Timeline</a:t>
             </a:r>
           </a:p>
         </p:txBody>
@@ -13765,7 +13765,7 @@
                       <a:pPr algn="ctr"/>
                       <a:r>
                         <a:rPr lang="en-US" sz="1800" dirty="0"/>
-                        <a:t>Impact factor</a:t>
+                        <a:t>Milestone</a:t>
                       </a:r>
                     </a:p>
                   </a:txBody>
@@ -13779,7 +13779,7 @@
                       <a:pPr algn="ctr"/>
                       <a:r>
                         <a:rPr lang="en-US" sz="1800" dirty="0"/>
-                        <a:t>Measurement</a:t>
+                        <a:t>Date</a:t>
                       </a:r>
                     </a:p>
                   </a:txBody>
@@ -13793,7 +13793,7 @@
                       <a:pPr algn="ctr"/>
                       <a:r>
                         <a:rPr lang="en-US" sz="1800" dirty="0"/>
-                        <a:t>Target</a:t>
+                        <a:t>RFP Release</a:t>
                       </a:r>
                     </a:p>
                   </a:txBody>
@@ -13807,7 +13807,7 @@
                       <a:pPr algn="ctr"/>
                       <a:r>
                         <a:rPr lang="en-US" sz="1800" dirty="0"/>
-                        <a:t>Achieved</a:t>
+                        <a:t>May 10, 2025</a:t>
                       </a:r>
                     </a:p>
                   </a:txBody>
@@ -13828,7 +13828,7 @@
                       <a:pPr algn="ctr"/>
                       <a:r>
                         <a:rPr lang="en-US" dirty="0"/>
-                        <a:t>Audience interaction</a:t>
+                        <a:t>Questions Due</a:t>
                       </a:r>
                     </a:p>
                   </a:txBody>
@@ -13842,7 +13842,7 @@
                       <a:pPr algn="ctr"/>
                       <a:r>
                         <a:rPr lang="en-US" dirty="0"/>
-                        <a:t>Percentage (%)</a:t>
+                        <a:t>May 17, 2025</a:t>
                       </a:r>
                     </a:p>
                   </a:txBody>
@@ -13856,7 +13856,7 @@
                       <a:pPr algn="ctr"/>
                       <a:r>
                         <a:rPr lang="en-US" dirty="0"/>
-                        <a:t>85</a:t>
+                        <a:t>Proposal Submission</a:t>
                       </a:r>
                     </a:p>
                   </a:txBody>
@@ -13870,7 +13870,7 @@
                       <a:pPr algn="ctr"/>
                       <a:r>
                         <a:rPr lang="en-US" dirty="0"/>
-                        <a:t>88</a:t>
+                        <a:t>May 24, 2025</a:t>
                       </a:r>
                     </a:p>
                   </a:txBody>
@@ -13891,7 +13891,7 @@
                       <a:pPr algn="ctr"/>
                       <a:r>
                         <a:rPr lang="en-US" dirty="0"/>
-                        <a:t>Knowledge retention</a:t>
+                        <a:t>Vendor Selection</a:t>
                       </a:r>
                     </a:p>
                   </a:txBody>
@@ -13905,7 +13905,7 @@
                       <a:pPr algn="ctr"/>
                       <a:r>
                         <a:rPr lang="en-US" dirty="0"/>
-                        <a:t>Percentage (%)</a:t>
+                        <a:t>June 1, 2025</a:t>
                       </a:r>
                     </a:p>
                   </a:txBody>
@@ -13919,7 +13919,7 @@
                       <a:pPr algn="ctr"/>
                       <a:r>
                         <a:rPr lang="en-US" dirty="0"/>
-                        <a:t>75</a:t>
+                        <a:t>Project Kickoff</a:t>
                       </a:r>
                     </a:p>
                   </a:txBody>
@@ -13933,7 +13933,7 @@
                       <a:pPr algn="ctr"/>
                       <a:r>
                         <a:rPr lang="en-US" dirty="0"/>
-                        <a:t>80</a:t>
+                        <a:t>June 10, 2025</a:t>
                       </a:r>
                     </a:p>
                   </a:txBody>
@@ -14196,7 +14196,7 @@
           <a:p>
             <a:r>
               <a:rPr lang="en-US" dirty="0"/>
-              <a:t>Thank you</a:t>
+              <a:t>Thank you for your consideration</a:t>
             </a:r>
           </a:p>
         </p:txBody>
@@ -14229,13 +14229,13 @@
           <a:p>
             <a:r>
               <a:rPr lang="en-US" dirty="0"/>
-              <a:t>Sifatul Rabbi</a:t>
+              <a:t>Questions?</a:t>
             </a:r>
           </a:p>
           <a:p>
             <a:r>
               <a:rPr lang="en-US" dirty="0"/>
-              <a:t>502-555-0152</a:t>
+              <a:t>Contact: rfp@telecomx.com</a:t>
             </a:r>
           </a:p>
           <a:p>
@@ -14310,7 +14310,7 @@
           <a:p>
             <a:r>
               <a:rPr lang="en-US" dirty="0"/>
-              <a:t>Updated Basic Presentation</a:t>
+              <a:t>TeleComX AI Chatbot Proposal</a:t>
             </a:r>
           </a:p>
         </p:txBody>
@@ -14408,31 +14408,31 @@
           <a:p>
             <a:r>
               <a:rPr lang="en-US" dirty="0"/>
-              <a:t>Introduction</a:t>
+              <a:t>Project Overview</a:t>
             </a:r>
           </a:p>
           <a:p>
             <a:r>
               <a:rPr lang="en-US" dirty="0"/>
-              <a:t>Building confidence</a:t>
+              <a:t>Client Needs &amp; Pain Points</a:t>
             </a:r>
           </a:p>
           <a:p>
             <a:r>
               <a:rPr lang="en-US" dirty="0"/>
-              <a:t>Engaging the audience</a:t>
+              <a:t>Our Solution &amp; Approach</a:t>
             </a:r>
           </a:p>
           <a:p>
             <a:r>
               <a:rPr lang="en-US" dirty="0"/>
-              <a:t>Visual aids</a:t>
+              <a:t>Key Features &amp; Architecture</a:t>
             </a:r>
           </a:p>
           <a:p>
             <a:r>
               <a:rPr lang="en-US" dirty="0"/>
-              <a:t>Final tips &amp; takeaways</a:t>
+              <a:t>Compliance &amp; Security</a:t>
             </a:r>
           </a:p>
         </p:txBody>
@@ -14495,7 +14495,7 @@
           <a:p>
             <a:r>
               <a:rPr lang="en-US" dirty="0"/>
-              <a:t>The power of communication</a:t>
+              <a:t>Project Overview</a:t>
             </a:r>
           </a:p>
         </p:txBody>
@@ -14594,7 +14594,7 @@
           <a:p>
             <a:r>
               <a:rPr lang="en-US" dirty="0"/>
-              <a:t>Overcoming nervousness</a:t>
+              <a:t>Client Needs &amp; Pain Points</a:t>
             </a:r>
           </a:p>
         </p:txBody>
@@ -14627,7 +14627,7 @@
           <a:p>
             <a:r>
               <a:rPr lang="en-US" dirty="0"/>
-              <a:t>Confidence-building strategies</a:t>
+              <a:t>Manual triage &amp; routing delays</a:t>
             </a:r>
           </a:p>
         </p:txBody>
@@ -14726,7 +14726,7 @@
           <a:p>
             <a:r>
               <a:rPr lang="en-US" dirty="0"/>
-              <a:t>Engaging the audience</a:t>
+              <a:t>Our Solution &amp; Approach</a:t>
             </a:r>
           </a:p>
         </p:txBody>
@@ -14761,25 +14761,25 @@
           <a:p>
             <a:r>
               <a:rPr lang="en-US" dirty="0"/>
-              <a:t>Make eye contact with your audience to create a sense of intimacy and involvement</a:t>
+              <a:t>AI chatbot with natural language understanding &amp; context awareness</a:t>
             </a:r>
           </a:p>
           <a:p>
             <a:r>
               <a:rPr lang="en-US" dirty="0"/>
-              <a:t>Weave relatable stories into your presentation using narratives that make your message memorable and impactful</a:t>
+              <a:t>Automate responses to common queries (target: 80%+ auto-resolution)</a:t>
             </a:r>
           </a:p>
           <a:p>
             <a:r>
               <a:rPr lang="en-US" dirty="0"/>
-              <a:t>Encourage questions and provide thoughtful responses to enhance audience participation</a:t>
+              <a:t>Seamless escalation to human agents with conversation history</a:t>
             </a:r>
           </a:p>
           <a:p>
             <a:r>
               <a:rPr lang="en-US" dirty="0"/>
-              <a:t>Use live polls or surveys to gather audience opinions, promoting engagement and making sure the audience feel involved</a:t>
+              <a:t>Bilingual support (English &amp; Bengali)</a:t>
             </a:r>
           </a:p>
         </p:txBody>
@@ -14842,14 +14842,14 @@
           <a:p>
             <a:r>
               <a:rPr lang="en-US" dirty="0"/>
-              <a:t>Selecting </a:t>
+              <a:t>Key Features &amp; Architecture</a:t>
             </a:r>
             <a:br>
               <a:rPr lang="en-US" dirty="0"/>
             </a:br>
             <a:r>
               <a:rPr lang="en-US" dirty="0"/>
-              <a:t>visual aids</a:t>
+              <a:t>RESTful APIs, secure OAuth2, audit logging</a:t>
             </a:r>
           </a:p>
         </p:txBody>
@@ -14882,7 +14882,7 @@
           <a:p>
             <a:r>
               <a:rPr lang="en-US" dirty="0"/>
-              <a:t>Enhancing your presentation</a:t>
+              <a:t>Admin dashboard, analytics, multi-platform widgets</a:t>
             </a:r>
           </a:p>
         </p:txBody>
@@ -14945,7 +14945,7 @@
           <a:p>
             <a:r>
               <a:rPr lang="en-US" dirty="0"/>
-              <a:t>Effective delivery techniques</a:t>
+              <a:t>Technical Architecture</a:t>
             </a:r>
           </a:p>
         </p:txBody>
@@ -14978,28 +14978,28 @@
           <a:p>
             <a:r>
               <a:rPr lang="en-US" dirty="0"/>
-              <a:t>This is a powerful tool in public speaking. It involves varying pitch, tone, and volume to convey emotion, emphasize points, and maintain interest: </a:t>
+              <a:t>AI Chatbot Engine (NLU, context management)</a:t>
             </a:r>
           </a:p>
           <a:p>
             <a:pPr lvl="1"/>
             <a:r>
               <a:rPr lang="en-US" dirty="0"/>
-              <a:t>Pitch variation</a:t>
+              <a:t>CRM Integration (Salesforce API)</a:t>
             </a:r>
           </a:p>
           <a:p>
             <a:pPr lvl="1"/>
             <a:r>
               <a:rPr lang="en-US" dirty="0"/>
-              <a:t>Tone inflection</a:t>
+              <a:t>Ticketing Integration (Zendesk API)</a:t>
             </a:r>
           </a:p>
           <a:p>
             <a:pPr lvl="1"/>
             <a:r>
               <a:rPr lang="en-US" dirty="0"/>
-              <a:t>Volume control</a:t>
+              <a:t>Admin Dashboard (monitoring, analytics)</a:t>
             </a:r>
           </a:p>
         </p:txBody>
@@ -15032,11 +15032,11 @@
           <a:p>
             <a:r>
               <a:rPr lang="en-US" dirty="0"/>
-              <a:t>Effective body language enhances your message, making it more impactful </a:t>
+              <a:t>Web/Mobile Widgets (React, Flutter)</a:t>
             </a:r>
             <a:r>
               <a:rPr lang="en-US"/>
-              <a:t>and memorable:</a:t>
+              <a:t>Secure API Gateway</a:t>
             </a:r>
             <a:endParaRPr lang="en-US" dirty="0"/>
           </a:p>
@@ -15044,14 +15044,14 @@
             <a:pPr lvl="1"/>
             <a:r>
               <a:rPr lang="en-US" dirty="0"/>
-              <a:t>Meaningful eye contact</a:t>
+              <a:t>Data Encryption (TLS, AES-256)</a:t>
             </a:r>
           </a:p>
           <a:p>
             <a:pPr lvl="1"/>
             <a:r>
               <a:rPr lang="en-US" dirty="0"/>
-              <a:t>Purposeful gestures</a:t>
+              <a:t>High Availability, Cloud Deployment</a:t>
             </a:r>
           </a:p>
           <a:p>
@@ -15128,7 +15128,7 @@
           <a:p>
             <a:r>
               <a:rPr lang="en-US" dirty="0"/>
-              <a:t>Navigating Q&amp;A sessions</a:t>
+              <a:t>Compliance &amp; Security</a:t>
             </a:r>
           </a:p>
         </p:txBody>
@@ -15163,19 +15163,19 @@
           <a:p>
             <a:r>
               <a:rPr lang="en-US" dirty="0"/>
-              <a:t>Know your material in advance</a:t>
+              <a:t>GDPR &amp; Bangladesh Data Protection compliance</a:t>
             </a:r>
           </a:p>
           <a:p>
             <a:r>
               <a:rPr lang="en-US" dirty="0"/>
-              <a:t>Anticipate common questions</a:t>
+              <a:t>Role-based access, in-country data storage</a:t>
             </a:r>
           </a:p>
           <a:p>
             <a:r>
               <a:rPr lang="en-US" dirty="0"/>
-              <a:t>Rehearse your responses</a:t>
+              <a:t>End-to-end encryption (in transit &amp; at rest)</a:t>
             </a:r>
           </a:p>
         </p:txBody>
@@ -15210,28 +15210,28 @@
           <a:p>
             <a:r>
               <a:rPr lang="en-US" dirty="0"/>
-              <a:t>Maintaining composure during the Q&amp;A session is essential for projecting confidence and authority. Consider the following tips for staying composed:</a:t>
+              <a:t>Audit logs &amp; monitoring</a:t>
             </a:r>
           </a:p>
           <a:p>
             <a:pPr lvl="1"/>
             <a:r>
               <a:rPr lang="en-US" dirty="0"/>
-              <a:t>Stay calm</a:t>
+              <a:t>Breach reporting within 24h</a:t>
             </a:r>
           </a:p>
           <a:p>
             <a:pPr lvl="1"/>
             <a:r>
               <a:rPr lang="en-US" dirty="0"/>
-              <a:t>Actively listen</a:t>
+              <a:t>Mandatory privacy &amp; security training</a:t>
             </a:r>
           </a:p>
           <a:p>
             <a:pPr lvl="1"/>
             <a:r>
               <a:rPr lang="en-US" dirty="0"/>
-              <a:t>Pause and reflect</a:t>
+              <a:t>Vendor &amp; sub-processor compliance</a:t>
             </a:r>
           </a:p>
           <a:p>
@@ -15304,7 +15304,7 @@
           <a:p>
             <a:r>
               <a:rPr lang="en-US" dirty="0"/>
-              <a:t>Speaking impact </a:t>
+              <a:t>Implementation Plan &amp; Milestones</a:t>
             </a:r>
           </a:p>
         </p:txBody>
@@ -15337,13 +15337,13 @@
           <a:p>
             <a:r>
               <a:rPr lang="en-US" dirty="0"/>
-              <a:t>Your ability to communicate effectively will leave a lasting impact on your audience</a:t>
+              <a:t>Discovery &amp; requirements (with TeleComX stakeholders)</a:t>
             </a:r>
           </a:p>
           <a:p>
             <a:r>
               <a:rPr lang="en-US" dirty="0"/>
-              <a:t>Effectively communicating involves not only delivering a message but also resonating with the experiences, values, and emotions of those listening </a:t>
+              <a:t>Development &amp; integration (AI, CRM, ticketing, widgets)</a:t>
             </a:r>
           </a:p>
         </p:txBody>

</xml_diff>